<commit_message>
Chap05: Pictures done and some corrected. Need to do: picture for experiment schema and captions.
</commit_message>
<xml_diff>
--- a/05-CrDyn/Pictures/PWPump.pptx
+++ b/05-CrDyn/Pictures/PWPump.pptx
@@ -288,7 +288,7 @@
           <a:p>
             <a:fld id="{0E286767-5D18-49F0-944B-FB1FAC7990BF}" type="datetimeFigureOut">
               <a:rPr lang="fr-FR" smtClean="0"/>
-              <a:t>29/06/2017</a:t>
+              <a:t>01/07/2017</a:t>
             </a:fld>
             <a:endParaRPr lang="fr-FR"/>
           </a:p>
@@ -458,7 +458,7 @@
           <a:p>
             <a:fld id="{0E286767-5D18-49F0-944B-FB1FAC7990BF}" type="datetimeFigureOut">
               <a:rPr lang="fr-FR" smtClean="0"/>
-              <a:t>29/06/2017</a:t>
+              <a:t>01/07/2017</a:t>
             </a:fld>
             <a:endParaRPr lang="fr-FR"/>
           </a:p>
@@ -638,7 +638,7 @@
           <a:p>
             <a:fld id="{0E286767-5D18-49F0-944B-FB1FAC7990BF}" type="datetimeFigureOut">
               <a:rPr lang="fr-FR" smtClean="0"/>
-              <a:t>29/06/2017</a:t>
+              <a:t>01/07/2017</a:t>
             </a:fld>
             <a:endParaRPr lang="fr-FR"/>
           </a:p>
@@ -808,7 +808,7 @@
           <a:p>
             <a:fld id="{0E286767-5D18-49F0-944B-FB1FAC7990BF}" type="datetimeFigureOut">
               <a:rPr lang="fr-FR" smtClean="0"/>
-              <a:t>29/06/2017</a:t>
+              <a:t>01/07/2017</a:t>
             </a:fld>
             <a:endParaRPr lang="fr-FR"/>
           </a:p>
@@ -1054,7 +1054,7 @@
           <a:p>
             <a:fld id="{0E286767-5D18-49F0-944B-FB1FAC7990BF}" type="datetimeFigureOut">
               <a:rPr lang="fr-FR" smtClean="0"/>
-              <a:t>29/06/2017</a:t>
+              <a:t>01/07/2017</a:t>
             </a:fld>
             <a:endParaRPr lang="fr-FR"/>
           </a:p>
@@ -1342,7 +1342,7 @@
           <a:p>
             <a:fld id="{0E286767-5D18-49F0-944B-FB1FAC7990BF}" type="datetimeFigureOut">
               <a:rPr lang="fr-FR" smtClean="0"/>
-              <a:t>29/06/2017</a:t>
+              <a:t>01/07/2017</a:t>
             </a:fld>
             <a:endParaRPr lang="fr-FR"/>
           </a:p>
@@ -1769,7 +1769,7 @@
           <a:p>
             <a:fld id="{0E286767-5D18-49F0-944B-FB1FAC7990BF}" type="datetimeFigureOut">
               <a:rPr lang="fr-FR" smtClean="0"/>
-              <a:t>29/06/2017</a:t>
+              <a:t>01/07/2017</a:t>
             </a:fld>
             <a:endParaRPr lang="fr-FR"/>
           </a:p>
@@ -1887,7 +1887,7 @@
           <a:p>
             <a:fld id="{0E286767-5D18-49F0-944B-FB1FAC7990BF}" type="datetimeFigureOut">
               <a:rPr lang="fr-FR" smtClean="0"/>
-              <a:t>29/06/2017</a:t>
+              <a:t>01/07/2017</a:t>
             </a:fld>
             <a:endParaRPr lang="fr-FR"/>
           </a:p>
@@ -1982,7 +1982,7 @@
           <a:p>
             <a:fld id="{0E286767-5D18-49F0-944B-FB1FAC7990BF}" type="datetimeFigureOut">
               <a:rPr lang="fr-FR" smtClean="0"/>
-              <a:t>29/06/2017</a:t>
+              <a:t>01/07/2017</a:t>
             </a:fld>
             <a:endParaRPr lang="fr-FR"/>
           </a:p>
@@ -2259,7 +2259,7 @@
           <a:p>
             <a:fld id="{0E286767-5D18-49F0-944B-FB1FAC7990BF}" type="datetimeFigureOut">
               <a:rPr lang="fr-FR" smtClean="0"/>
-              <a:t>29/06/2017</a:t>
+              <a:t>01/07/2017</a:t>
             </a:fld>
             <a:endParaRPr lang="fr-FR"/>
           </a:p>
@@ -2512,7 +2512,7 @@
           <a:p>
             <a:fld id="{0E286767-5D18-49F0-944B-FB1FAC7990BF}" type="datetimeFigureOut">
               <a:rPr lang="fr-FR" smtClean="0"/>
-              <a:t>29/06/2017</a:t>
+              <a:t>01/07/2017</a:t>
             </a:fld>
             <a:endParaRPr lang="fr-FR"/>
           </a:p>
@@ -2725,7 +2725,7 @@
           <a:p>
             <a:fld id="{0E286767-5D18-49F0-944B-FB1FAC7990BF}" type="datetimeFigureOut">
               <a:rPr lang="fr-FR" smtClean="0"/>
-              <a:t>29/06/2017</a:t>
+              <a:t>01/07/2017</a:t>
             </a:fld>
             <a:endParaRPr lang="fr-FR"/>
           </a:p>
@@ -3189,8 +3189,8 @@
           </p:blipFill>
           <p:spPr bwMode="auto">
             <a:xfrm>
-              <a:off x="1407975" y="152150"/>
-              <a:ext cx="1228725" cy="1480269"/>
+              <a:off x="1538360" y="152911"/>
+              <a:ext cx="1134638" cy="1366922"/>
             </a:xfrm>
             <a:prstGeom prst="rect">
               <a:avLst/>

</xml_diff>

<commit_message>
Chap05: Corrections until p.15
</commit_message>
<xml_diff>
--- a/05-CrDyn/Pictures/PWPump.pptx
+++ b/05-CrDyn/Pictures/PWPump.pptx
@@ -288,7 +288,7 @@
           <a:p>
             <a:fld id="{0E286767-5D18-49F0-944B-FB1FAC7990BF}" type="datetimeFigureOut">
               <a:rPr lang="fr-FR" smtClean="0"/>
-              <a:t>01/07/2017</a:t>
+              <a:t>24/10/2017</a:t>
             </a:fld>
             <a:endParaRPr lang="fr-FR"/>
           </a:p>
@@ -458,7 +458,7 @@
           <a:p>
             <a:fld id="{0E286767-5D18-49F0-944B-FB1FAC7990BF}" type="datetimeFigureOut">
               <a:rPr lang="fr-FR" smtClean="0"/>
-              <a:t>01/07/2017</a:t>
+              <a:t>24/10/2017</a:t>
             </a:fld>
             <a:endParaRPr lang="fr-FR"/>
           </a:p>
@@ -638,7 +638,7 @@
           <a:p>
             <a:fld id="{0E286767-5D18-49F0-944B-FB1FAC7990BF}" type="datetimeFigureOut">
               <a:rPr lang="fr-FR" smtClean="0"/>
-              <a:t>01/07/2017</a:t>
+              <a:t>24/10/2017</a:t>
             </a:fld>
             <a:endParaRPr lang="fr-FR"/>
           </a:p>
@@ -808,7 +808,7 @@
           <a:p>
             <a:fld id="{0E286767-5D18-49F0-944B-FB1FAC7990BF}" type="datetimeFigureOut">
               <a:rPr lang="fr-FR" smtClean="0"/>
-              <a:t>01/07/2017</a:t>
+              <a:t>24/10/2017</a:t>
             </a:fld>
             <a:endParaRPr lang="fr-FR"/>
           </a:p>
@@ -1054,7 +1054,7 @@
           <a:p>
             <a:fld id="{0E286767-5D18-49F0-944B-FB1FAC7990BF}" type="datetimeFigureOut">
               <a:rPr lang="fr-FR" smtClean="0"/>
-              <a:t>01/07/2017</a:t>
+              <a:t>24/10/2017</a:t>
             </a:fld>
             <a:endParaRPr lang="fr-FR"/>
           </a:p>
@@ -1342,7 +1342,7 @@
           <a:p>
             <a:fld id="{0E286767-5D18-49F0-944B-FB1FAC7990BF}" type="datetimeFigureOut">
               <a:rPr lang="fr-FR" smtClean="0"/>
-              <a:t>01/07/2017</a:t>
+              <a:t>24/10/2017</a:t>
             </a:fld>
             <a:endParaRPr lang="fr-FR"/>
           </a:p>
@@ -1769,7 +1769,7 @@
           <a:p>
             <a:fld id="{0E286767-5D18-49F0-944B-FB1FAC7990BF}" type="datetimeFigureOut">
               <a:rPr lang="fr-FR" smtClean="0"/>
-              <a:t>01/07/2017</a:t>
+              <a:t>24/10/2017</a:t>
             </a:fld>
             <a:endParaRPr lang="fr-FR"/>
           </a:p>
@@ -1887,7 +1887,7 @@
           <a:p>
             <a:fld id="{0E286767-5D18-49F0-944B-FB1FAC7990BF}" type="datetimeFigureOut">
               <a:rPr lang="fr-FR" smtClean="0"/>
-              <a:t>01/07/2017</a:t>
+              <a:t>24/10/2017</a:t>
             </a:fld>
             <a:endParaRPr lang="fr-FR"/>
           </a:p>
@@ -1982,7 +1982,7 @@
           <a:p>
             <a:fld id="{0E286767-5D18-49F0-944B-FB1FAC7990BF}" type="datetimeFigureOut">
               <a:rPr lang="fr-FR" smtClean="0"/>
-              <a:t>01/07/2017</a:t>
+              <a:t>24/10/2017</a:t>
             </a:fld>
             <a:endParaRPr lang="fr-FR"/>
           </a:p>
@@ -2259,7 +2259,7 @@
           <a:p>
             <a:fld id="{0E286767-5D18-49F0-944B-FB1FAC7990BF}" type="datetimeFigureOut">
               <a:rPr lang="fr-FR" smtClean="0"/>
-              <a:t>01/07/2017</a:t>
+              <a:t>24/10/2017</a:t>
             </a:fld>
             <a:endParaRPr lang="fr-FR"/>
           </a:p>
@@ -2512,7 +2512,7 @@
           <a:p>
             <a:fld id="{0E286767-5D18-49F0-944B-FB1FAC7990BF}" type="datetimeFigureOut">
               <a:rPr lang="fr-FR" smtClean="0"/>
-              <a:t>01/07/2017</a:t>
+              <a:t>24/10/2017</a:t>
             </a:fld>
             <a:endParaRPr lang="fr-FR"/>
           </a:p>
@@ -2725,7 +2725,7 @@
           <a:p>
             <a:fld id="{0E286767-5D18-49F0-944B-FB1FAC7990BF}" type="datetimeFigureOut">
               <a:rPr lang="fr-FR" smtClean="0"/>
-              <a:t>01/07/2017</a:t>
+              <a:t>24/10/2017</a:t>
             </a:fld>
             <a:endParaRPr lang="fr-FR"/>
           </a:p>
@@ -3100,127 +3100,169 @@
           <a:chExt cx="0" cy="0"/>
         </a:xfrm>
       </p:grpSpPr>
-      <p:grpSp>
-        <p:nvGrpSpPr>
-          <p:cNvPr id="25" name="Groupe 24"/>
-          <p:cNvGrpSpPr>
-            <a:grpSpLocks noChangeAspect="1"/>
-          </p:cNvGrpSpPr>
+      <p:pic>
+        <p:nvPicPr>
+          <p:cNvPr id="26" name="Picture 8"/>
+          <p:cNvPicPr>
+            <a:picLocks noChangeAspect="1" noChangeArrowheads="1"/>
+          </p:cNvPicPr>
           <p:nvPr/>
-        </p:nvGrpSpPr>
-        <p:grpSpPr>
+        </p:nvPicPr>
+        <p:blipFill rotWithShape="1">
+          <a:blip r:embed="rId2" cstate="print">
+            <a:extLst>
+              <a:ext uri="{28A0092B-C50C-407E-A947-70E740481C1C}">
+                <a14:useLocalDpi xmlns:a14="http://schemas.microsoft.com/office/drawing/2010/main" val="0"/>
+              </a:ext>
+            </a:extLst>
+          </a:blip>
+          <a:srcRect b="2896"/>
+          <a:stretch/>
+        </p:blipFill>
+        <p:spPr bwMode="auto">
           <a:xfrm>
             <a:off x="-612576" y="-171400"/>
             <a:ext cx="4956729" cy="5400000"/>
-            <a:chOff x="96663" y="0"/>
-            <a:chExt cx="2895488" cy="3154436"/>
           </a:xfrm>
-        </p:grpSpPr>
-        <p:pic>
-          <p:nvPicPr>
-            <p:cNvPr id="26" name="Picture 8"/>
-            <p:cNvPicPr>
-              <a:picLocks noChangeAspect="1" noChangeArrowheads="1"/>
-            </p:cNvPicPr>
-            <p:nvPr/>
-          </p:nvPicPr>
-          <p:blipFill rotWithShape="1">
-            <a:blip r:embed="rId2" cstate="print">
-              <a:extLst>
-                <a:ext uri="{28A0092B-C50C-407E-A947-70E740481C1C}">
-                  <a14:useLocalDpi xmlns:a14="http://schemas.microsoft.com/office/drawing/2010/main" val="0"/>
-                </a:ext>
-              </a:extLst>
-            </a:blip>
-            <a:srcRect b="2896"/>
-            <a:stretch/>
-          </p:blipFill>
-          <p:spPr bwMode="auto">
-            <a:xfrm>
-              <a:off x="96663" y="0"/>
-              <a:ext cx="2895488" cy="3154436"/>
-            </a:xfrm>
-            <a:prstGeom prst="rect">
-              <a:avLst/>
-            </a:prstGeom>
+          <a:prstGeom prst="rect">
+            <a:avLst/>
+          </a:prstGeom>
+          <a:noFill/>
+          <a:ln>
             <a:noFill/>
-            <a:ln>
-              <a:noFill/>
-            </a:ln>
+          </a:ln>
+          <a:extLst>
+            <a:ext uri="{909E8E84-426E-40DD-AFC4-6F175D3DCCD1}">
+              <a14:hiddenFill xmlns:a14="http://schemas.microsoft.com/office/drawing/2010/main">
+                <a:solidFill>
+                  <a:schemeClr val="accent1"/>
+                </a:solidFill>
+              </a14:hiddenFill>
+            </a:ext>
+            <a:ext uri="{91240B29-F687-4F45-9708-019B960494DF}">
+              <a14:hiddenLine xmlns:a14="http://schemas.microsoft.com/office/drawing/2010/main" w="9525">
+                <a:solidFill>
+                  <a:schemeClr val="tx1"/>
+                </a:solidFill>
+                <a:miter lim="800000"/>
+                <a:headEnd/>
+                <a:tailEnd/>
+              </a14:hiddenLine>
+            </a:ext>
+          </a:extLst>
+        </p:spPr>
+      </p:pic>
+      <p:pic>
+        <p:nvPicPr>
+          <p:cNvPr id="6" name="Picture 7"/>
+          <p:cNvPicPr>
+            <a:picLocks noChangeAspect="1" noChangeArrowheads="1"/>
+          </p:cNvPicPr>
+          <p:nvPr/>
+        </p:nvPicPr>
+        <p:blipFill rotWithShape="1">
+          <a:blip r:embed="rId3" cstate="print">
             <a:extLst>
-              <a:ext uri="{909E8E84-426E-40DD-AFC4-6F175D3DCCD1}">
-                <a14:hiddenFill xmlns:a14="http://schemas.microsoft.com/office/drawing/2010/main">
-                  <a:solidFill>
-                    <a:schemeClr val="accent1"/>
-                  </a:solidFill>
-                </a14:hiddenFill>
-              </a:ext>
-              <a:ext uri="{91240B29-F687-4F45-9708-019B960494DF}">
-                <a14:hiddenLine xmlns:a14="http://schemas.microsoft.com/office/drawing/2010/main" w="9525">
-                  <a:solidFill>
-                    <a:schemeClr val="tx1"/>
-                  </a:solidFill>
-                  <a:miter lim="800000"/>
-                  <a:headEnd/>
-                  <a:tailEnd/>
-                </a14:hiddenLine>
+              <a:ext uri="{28A0092B-C50C-407E-A947-70E740481C1C}">
+                <a14:useLocalDpi xmlns:a14="http://schemas.microsoft.com/office/drawing/2010/main" val="0"/>
               </a:ext>
             </a:extLst>
-          </p:spPr>
-        </p:pic>
-        <p:pic>
-          <p:nvPicPr>
-            <p:cNvPr id="27" name="Picture 7"/>
-            <p:cNvPicPr>
-              <a:picLocks noChangeAspect="1" noChangeArrowheads="1"/>
-            </p:cNvPicPr>
-            <p:nvPr/>
-          </p:nvPicPr>
-          <p:blipFill rotWithShape="1">
-            <a:blip r:embed="rId3" cstate="print">
-              <a:extLst>
-                <a:ext uri="{28A0092B-C50C-407E-A947-70E740481C1C}">
-                  <a14:useLocalDpi xmlns:a14="http://schemas.microsoft.com/office/drawing/2010/main" val="0"/>
-                </a:ext>
-              </a:extLst>
-            </a:blip>
-            <a:srcRect l="5799" r="9330"/>
-            <a:stretch/>
-          </p:blipFill>
-          <p:spPr bwMode="auto">
-            <a:xfrm>
-              <a:off x="1538360" y="152911"/>
-              <a:ext cx="1134638" cy="1366922"/>
-            </a:xfrm>
-            <a:prstGeom prst="rect">
-              <a:avLst/>
-            </a:prstGeom>
+          </a:blip>
+          <a:srcRect l="6452" t="2013" r="10978" b="3117"/>
+          <a:stretch/>
+        </p:blipFill>
+        <p:spPr bwMode="auto">
+          <a:xfrm>
+            <a:off x="1717481" y="70525"/>
+            <a:ext cx="2092414" cy="2458075"/>
+          </a:xfrm>
+          <a:prstGeom prst="rect">
+            <a:avLst/>
+          </a:prstGeom>
+          <a:noFill/>
+          <a:ln>
             <a:noFill/>
-            <a:ln>
-              <a:noFill/>
-            </a:ln>
-            <a:extLst>
-              <a:ext uri="{909E8E84-426E-40DD-AFC4-6F175D3DCCD1}">
-                <a14:hiddenFill xmlns:a14="http://schemas.microsoft.com/office/drawing/2010/main">
-                  <a:solidFill>
-                    <a:schemeClr val="accent1"/>
-                  </a:solidFill>
-                </a14:hiddenFill>
-              </a:ext>
-              <a:ext uri="{91240B29-F687-4F45-9708-019B960494DF}">
-                <a14:hiddenLine xmlns:a14="http://schemas.microsoft.com/office/drawing/2010/main" w="9525">
-                  <a:solidFill>
-                    <a:schemeClr val="tx1"/>
-                  </a:solidFill>
-                  <a:miter lim="800000"/>
-                  <a:headEnd/>
-                  <a:tailEnd/>
-                </a14:hiddenLine>
-              </a:ext>
-            </a:extLst>
-          </p:spPr>
-        </p:pic>
-      </p:grpSp>
+          </a:ln>
+          <a:extLst>
+            <a:ext uri="{909E8E84-426E-40DD-AFC4-6F175D3DCCD1}">
+              <a14:hiddenFill xmlns:a14="http://schemas.microsoft.com/office/drawing/2010/main">
+                <a:solidFill>
+                  <a:schemeClr val="accent1"/>
+                </a:solidFill>
+              </a14:hiddenFill>
+            </a:ext>
+            <a:ext uri="{91240B29-F687-4F45-9708-019B960494DF}">
+              <a14:hiddenLine xmlns:a14="http://schemas.microsoft.com/office/drawing/2010/main" w="9525">
+                <a:solidFill>
+                  <a:schemeClr val="tx1"/>
+                </a:solidFill>
+                <a:miter lim="800000"/>
+                <a:headEnd/>
+                <a:tailEnd/>
+              </a14:hiddenLine>
+            </a:ext>
+          </a:extLst>
+        </p:spPr>
+      </p:pic>
+      <p:sp>
+        <p:nvSpPr>
+          <p:cNvPr id="2" name="ZoneTexte 1"/>
+          <p:cNvSpPr txBox="1"/>
+          <p:nvPr/>
+        </p:nvSpPr>
+        <p:spPr>
+          <a:xfrm rot="10800000">
+            <a:off x="1512640" y="520007"/>
+            <a:ext cx="461665" cy="965970"/>
+          </a:xfrm>
+          <a:prstGeom prst="rect">
+            <a:avLst/>
+          </a:prstGeom>
+          <a:solidFill>
+            <a:schemeClr val="bg1"/>
+          </a:solidFill>
+        </p:spPr>
+        <p:txBody>
+          <a:bodyPr vert="eaVert" wrap="none" rtlCol="0">
+            <a:spAutoFit/>
+          </a:bodyPr>
+          <a:lstStyle/>
+          <a:p>
+            <a:r>
+              <a:rPr lang="fr-FR" sz="1800" b="1" dirty="0" err="1">
+                <a:latin typeface="Symbol" panose="05050102010706020507" pitchFamily="18" charset="2"/>
+                <a:cs typeface="Times New Roman" panose="02020603050405020304" pitchFamily="18" charset="0"/>
+              </a:rPr>
+              <a:t>t</a:t>
+            </a:r>
+            <a:r>
+              <a:rPr lang="fr-FR" sz="1800" b="1" baseline="-25000" dirty="0" err="1" smtClean="0">
+                <a:latin typeface="Times New Roman" panose="02020603050405020304" pitchFamily="18" charset="0"/>
+                <a:cs typeface="Times New Roman" panose="02020603050405020304" pitchFamily="18" charset="0"/>
+              </a:rPr>
+              <a:t>pump</a:t>
+            </a:r>
+            <a:r>
+              <a:rPr lang="fr-FR" sz="1800" b="1" dirty="0" smtClean="0">
+                <a:latin typeface="Times New Roman" panose="02020603050405020304" pitchFamily="18" charset="0"/>
+                <a:cs typeface="Times New Roman" panose="02020603050405020304" pitchFamily="18" charset="0"/>
+              </a:rPr>
+              <a:t> </a:t>
+            </a:r>
+            <a:r>
+              <a:rPr lang="fr-FR" sz="1600" b="1" dirty="0" smtClean="0">
+                <a:latin typeface="Times New Roman" panose="02020603050405020304" pitchFamily="18" charset="0"/>
+                <a:cs typeface="Times New Roman" panose="02020603050405020304" pitchFamily="18" charset="0"/>
+              </a:rPr>
+              <a:t>(ns)</a:t>
+            </a:r>
+            <a:endParaRPr lang="fr-FR" sz="1600" b="1" dirty="0">
+              <a:latin typeface="Times New Roman" panose="02020603050405020304" pitchFamily="18" charset="0"/>
+              <a:cs typeface="Times New Roman" panose="02020603050405020304" pitchFamily="18" charset="0"/>
+            </a:endParaRPr>
+          </a:p>
+        </p:txBody>
+      </p:sp>
     </p:spTree>
     <p:extLst>
       <p:ext uri="{BB962C8B-B14F-4D97-AF65-F5344CB8AC3E}">

</xml_diff>